<commit_message>
Cleaned up specification document
</commit_message>
<xml_diff>
--- a/0-Doc/OpenO&M Information Service Bus Model (ISBM) Specification Diagrams.pptx
+++ b/0-Doc/OpenO&M Information Service Bus Model (ISBM) Specification Diagrams.pptx
@@ -17372,7 +17372,6 @@
               <a:rPr lang="en-US" sz="1000" b="0" dirty="0"/>
               <a:t>Finish Post Publication</a:t>
             </a:r>
-            <a:endParaRPr lang="en-US" sz="1000" b="0" dirty="0"/>
           </a:p>
         </p:txBody>
       </p:sp>
@@ -35436,7 +35435,7 @@
         <p:spPr bwMode="auto">
           <a:xfrm>
             <a:off x="942881" y="4038600"/>
-            <a:ext cx="3095719" cy="2308324"/>
+            <a:ext cx="3095719" cy="1754326"/>
           </a:xfrm>
           <a:prstGeom prst="rect">
             <a:avLst/>
@@ -35461,12 +35460,12 @@
               </a:tabLst>
             </a:pPr>
             <a:r>
-              <a:rPr lang="en-US" b="0" dirty="0"/>
-              <a:t>Assign Security </a:t>
-            </a:r>
-            <a:r>
               <a:rPr lang="en-US" b="0" dirty="0" smtClean="0"/>
-              <a:t>Tokens</a:t>
+              <a:t>Create </a:t>
+            </a:r>
+            <a:r>
+              <a:rPr lang="en-US" b="0" dirty="0" smtClean="0"/>
+              <a:t>Channel</a:t>
             </a:r>
           </a:p>
           <a:p>
@@ -35477,8 +35476,9 @@
             </a:pPr>
             <a:r>
               <a:rPr lang="en-US" b="0" dirty="0" smtClean="0"/>
-              <a:t>Create Channel</a:t>
-            </a:r>
+              <a:t>Create Channel Namespace</a:t>
+            </a:r>
+            <a:endParaRPr lang="en-US" b="0" dirty="0"/>
           </a:p>
           <a:p>
             <a:pPr>
@@ -35488,9 +35488,12 @@
             </a:pPr>
             <a:r>
               <a:rPr lang="en-US" b="0" dirty="0" smtClean="0"/>
-              <a:t>Create Channel Namespace</a:t>
-            </a:r>
-            <a:endParaRPr lang="en-US" b="0" dirty="0"/>
+              <a:t>Create </a:t>
+            </a:r>
+            <a:r>
+              <a:rPr lang="en-US" b="0" dirty="0"/>
+              <a:t>Topic</a:t>
+            </a:r>
           </a:p>
           <a:p>
             <a:pPr>
@@ -35499,12 +35502,8 @@
               </a:tabLst>
             </a:pPr>
             <a:r>
-              <a:rPr lang="en-US" b="0" dirty="0" smtClean="0"/>
-              <a:t>Create </a:t>
-            </a:r>
-            <a:r>
               <a:rPr lang="en-US" b="0" dirty="0"/>
-              <a:t>Topic</a:t>
+              <a:t>Delete Channel </a:t>
             </a:r>
           </a:p>
           <a:p>
@@ -35514,8 +35513,12 @@
               </a:tabLst>
             </a:pPr>
             <a:r>
+              <a:rPr lang="en-US" b="0" dirty="0" smtClean="0"/>
+              <a:t>Delete </a:t>
+            </a:r>
+            <a:r>
               <a:rPr lang="en-US" b="0" dirty="0"/>
-              <a:t>Delete Channel </a:t>
+              <a:t>Channel Namespace</a:t>
             </a:r>
           </a:p>
           <a:p>
@@ -35525,42 +35528,12 @@
               </a:tabLst>
             </a:pPr>
             <a:r>
+              <a:rPr lang="en-US" b="0" dirty="0"/>
+              <a:t>Delete </a:t>
+            </a:r>
+            <a:r>
               <a:rPr lang="en-US" b="0" dirty="0" smtClean="0"/>
-              <a:t>Delete </a:t>
-            </a:r>
-            <a:r>
-              <a:rPr lang="en-US" b="0" dirty="0"/>
-              <a:t>Channel Namespace</a:t>
-            </a:r>
-          </a:p>
-          <a:p>
-            <a:pPr>
-              <a:tabLst>
-                <a:tab pos="228600" algn="l"/>
-              </a:tabLst>
-            </a:pPr>
-            <a:r>
-              <a:rPr lang="en-US" b="0" dirty="0"/>
-              <a:t>Delete Topic</a:t>
-            </a:r>
-          </a:p>
-          <a:p>
-            <a:pPr>
-              <a:tabLst>
-                <a:tab pos="228600" algn="l"/>
-              </a:tabLst>
-            </a:pPr>
-            <a:r>
-              <a:rPr lang="en-US" b="0" dirty="0" smtClean="0"/>
-              <a:t>Remove </a:t>
-            </a:r>
-            <a:r>
-              <a:rPr lang="en-US" b="0" dirty="0"/>
-              <a:t>Security </a:t>
-            </a:r>
-            <a:r>
-              <a:rPr lang="en-US" b="0" dirty="0" smtClean="0"/>
-              <a:t>Tokens</a:t>
+              <a:t>Topic</a:t>
             </a:r>
             <a:endParaRPr lang="en-US" b="0" dirty="0"/>
           </a:p>

</xml_diff>

<commit_message>
Modified WSDL to be consistent with specification Removed XML Schema folder as it no longer applies Added data model
</commit_message>
<xml_diff>
--- a/0-Doc/OpenO&M Information Service Bus Model (ISBM) Specification Diagrams.pptx
+++ b/0-Doc/OpenO&M Information Service Bus Model (ISBM) Specification Diagrams.pptx
@@ -6220,8 +6220,8 @@
         </p:nvSpPr>
         <p:spPr bwMode="auto">
           <a:xfrm>
-            <a:off x="4977607" y="2895600"/>
-            <a:ext cx="1919287" cy="246063"/>
+            <a:off x="5076280" y="2895600"/>
+            <a:ext cx="1721945" cy="246221"/>
           </a:xfrm>
           <a:prstGeom prst="rect">
             <a:avLst/>
@@ -6242,9 +6242,10 @@
           <a:p>
             <a:pPr algn="ctr"/>
             <a:r>
-              <a:rPr lang="en-US" sz="1000" b="0"/>
-              <a:t>Subscribe Publication Channel</a:t>
-            </a:r>
+              <a:rPr lang="en-US" sz="1000" b="0" dirty="0" smtClean="0"/>
+              <a:t>Open Subscription Session</a:t>
+            </a:r>
+            <a:endParaRPr lang="en-US" sz="1000" b="0" dirty="0"/>
           </a:p>
         </p:txBody>
       </p:sp>
@@ -6479,8 +6480,8 @@
         </p:nvSpPr>
         <p:spPr bwMode="auto">
           <a:xfrm>
-            <a:off x="4905375" y="6019800"/>
-            <a:ext cx="2063750" cy="246062"/>
+            <a:off x="5068267" y="6019800"/>
+            <a:ext cx="1737975" cy="246221"/>
           </a:xfrm>
           <a:prstGeom prst="rect">
             <a:avLst/>
@@ -6501,9 +6502,10 @@
           <a:p>
             <a:pPr algn="ctr"/>
             <a:r>
-              <a:rPr lang="en-US" sz="1000" b="0" dirty="0"/>
-              <a:t>Unsubscribe Publication Channel</a:t>
-            </a:r>
+              <a:rPr lang="en-US" sz="1000" b="0" dirty="0" smtClean="0"/>
+              <a:t>Close Subscription Session</a:t>
+            </a:r>
+            <a:endParaRPr lang="en-US" sz="1000" b="0" dirty="0"/>
           </a:p>
         </p:txBody>
       </p:sp>
@@ -6662,8 +6664,8 @@
         </p:nvSpPr>
         <p:spPr bwMode="auto">
           <a:xfrm>
-            <a:off x="2361407" y="2514600"/>
-            <a:ext cx="1665287" cy="246063"/>
+            <a:off x="2372351" y="2514600"/>
+            <a:ext cx="1643400" cy="246221"/>
           </a:xfrm>
           <a:prstGeom prst="rect">
             <a:avLst/>
@@ -6684,9 +6686,14 @@
           <a:p>
             <a:pPr algn="ctr"/>
             <a:r>
-              <a:rPr lang="en-US" sz="1000" b="0"/>
-              <a:t>Open Publication Channel</a:t>
-            </a:r>
+              <a:rPr lang="en-US" sz="1000" b="0" dirty="0"/>
+              <a:t>Open Publication </a:t>
+            </a:r>
+            <a:r>
+              <a:rPr lang="en-US" sz="1000" b="0" dirty="0" smtClean="0"/>
+              <a:t>Session</a:t>
+            </a:r>
+            <a:endParaRPr lang="en-US" sz="1000" b="0" dirty="0"/>
           </a:p>
         </p:txBody>
       </p:sp>
@@ -7910,8 +7917,8 @@
         </p:nvSpPr>
         <p:spPr bwMode="auto">
           <a:xfrm>
-            <a:off x="4977607" y="3581400"/>
-            <a:ext cx="1919287" cy="246063"/>
+            <a:off x="5076280" y="3581400"/>
+            <a:ext cx="1721946" cy="246221"/>
           </a:xfrm>
           <a:prstGeom prst="rect">
             <a:avLst/>
@@ -7932,9 +7939,10 @@
           <a:p>
             <a:pPr algn="ctr"/>
             <a:r>
-              <a:rPr lang="en-US" sz="1000" b="0"/>
-              <a:t>Subscribe Publication Channel</a:t>
-            </a:r>
+              <a:rPr lang="en-US" sz="1000" b="0" dirty="0" smtClean="0"/>
+              <a:t>Open Subscription Session</a:t>
+            </a:r>
+            <a:endParaRPr lang="en-US" sz="1000" b="0" dirty="0"/>
           </a:p>
         </p:txBody>
       </p:sp>
@@ -8095,8 +8103,8 @@
         </p:nvSpPr>
         <p:spPr bwMode="auto">
           <a:xfrm>
-            <a:off x="4905375" y="6019800"/>
-            <a:ext cx="2063750" cy="246062"/>
+            <a:off x="5068262" y="6019800"/>
+            <a:ext cx="1737976" cy="246221"/>
           </a:xfrm>
           <a:prstGeom prst="rect">
             <a:avLst/>
@@ -8117,9 +8125,14 @@
           <a:p>
             <a:pPr algn="ctr"/>
             <a:r>
+              <a:rPr lang="en-US" sz="1000" b="0" dirty="0" smtClean="0"/>
+              <a:t>Close Subscription </a:t>
+            </a:r>
+            <a:r>
               <a:rPr lang="en-US" sz="1000" b="0" dirty="0"/>
-              <a:t>Unsubscribe Publication Channel</a:t>
-            </a:r>
+              <a:t>Session</a:t>
+            </a:r>
+            <a:endParaRPr lang="en-US" sz="1000" b="0" dirty="0"/>
           </a:p>
         </p:txBody>
       </p:sp>
@@ -8278,8 +8291,8 @@
         </p:nvSpPr>
         <p:spPr bwMode="auto">
           <a:xfrm>
-            <a:off x="2361407" y="2514600"/>
-            <a:ext cx="1665287" cy="246063"/>
+            <a:off x="2372351" y="2514600"/>
+            <a:ext cx="1643400" cy="246221"/>
           </a:xfrm>
           <a:prstGeom prst="rect">
             <a:avLst/>
@@ -8301,8 +8314,13 @@
             <a:pPr algn="ctr"/>
             <a:r>
               <a:rPr lang="en-US" sz="1000" b="0" dirty="0"/>
-              <a:t>Open Publication Channel</a:t>
-            </a:r>
+              <a:t>Open Publication </a:t>
+            </a:r>
+            <a:r>
+              <a:rPr lang="en-US" sz="1000" b="0" dirty="0" smtClean="0"/>
+              <a:t>Session</a:t>
+            </a:r>
+            <a:endParaRPr lang="en-US" sz="1000" b="0" dirty="0"/>
           </a:p>
         </p:txBody>
       </p:sp>
@@ -9566,8 +9584,8 @@
         </p:nvSpPr>
         <p:spPr bwMode="auto">
           <a:xfrm>
-            <a:off x="3429000" y="2014537"/>
-            <a:ext cx="1663700" cy="246063"/>
+            <a:off x="3439151" y="2014537"/>
+            <a:ext cx="1643400" cy="246221"/>
           </a:xfrm>
           <a:prstGeom prst="rect">
             <a:avLst/>
@@ -9589,8 +9607,13 @@
             <a:pPr algn="ctr"/>
             <a:r>
               <a:rPr lang="en-US" sz="1000" b="0" dirty="0"/>
-              <a:t>Open Publication Channel</a:t>
-            </a:r>
+              <a:t>Open Publication </a:t>
+            </a:r>
+            <a:r>
+              <a:rPr lang="en-US" sz="1000" b="0" dirty="0" smtClean="0"/>
+              <a:t>Session</a:t>
+            </a:r>
+            <a:endParaRPr lang="en-US" sz="1000" b="0" dirty="0"/>
           </a:p>
         </p:txBody>
       </p:sp>
@@ -9791,8 +9814,8 @@
         </p:nvSpPr>
         <p:spPr bwMode="auto">
           <a:xfrm>
-            <a:off x="993775" y="2774950"/>
-            <a:ext cx="1663700" cy="246062"/>
+            <a:off x="1003926" y="2774950"/>
+            <a:ext cx="1643400" cy="246221"/>
           </a:xfrm>
           <a:prstGeom prst="rect">
             <a:avLst/>
@@ -9814,8 +9837,13 @@
             <a:pPr algn="ctr"/>
             <a:r>
               <a:rPr lang="en-US" sz="1000" b="0" dirty="0"/>
-              <a:t>Open Publication Channel</a:t>
-            </a:r>
+              <a:t>Open Publication </a:t>
+            </a:r>
+            <a:r>
+              <a:rPr lang="en-US" sz="1000" b="0" dirty="0" smtClean="0"/>
+              <a:t>Session</a:t>
+            </a:r>
+            <a:endParaRPr lang="en-US" sz="1000" b="0" dirty="0"/>
           </a:p>
         </p:txBody>
       </p:sp>
@@ -9935,8 +9963,8 @@
         </p:nvSpPr>
         <p:spPr bwMode="auto">
           <a:xfrm>
-            <a:off x="6044407" y="3048000"/>
-            <a:ext cx="1919287" cy="246062"/>
+            <a:off x="6143078" y="3048000"/>
+            <a:ext cx="1721946" cy="246221"/>
           </a:xfrm>
           <a:prstGeom prst="rect">
             <a:avLst/>
@@ -9958,8 +9986,13 @@
             <a:pPr algn="ctr"/>
             <a:r>
               <a:rPr lang="en-US" sz="1000" b="0" dirty="0"/>
-              <a:t>Subscribe Publication Channel</a:t>
-            </a:r>
+              <a:t>Open </a:t>
+            </a:r>
+            <a:r>
+              <a:rPr lang="en-US" sz="1000" b="0" dirty="0" smtClean="0"/>
+              <a:t>Subscription Session</a:t>
+            </a:r>
+            <a:endParaRPr lang="en-US" sz="1000" b="0" dirty="0"/>
           </a:p>
         </p:txBody>
       </p:sp>
@@ -11265,7 +11298,7 @@
         <p:spPr bwMode="auto">
           <a:xfrm>
             <a:off x="914400" y="4038600"/>
-            <a:ext cx="3313728" cy="2308324"/>
+            <a:ext cx="3288080" cy="2308324"/>
           </a:xfrm>
           <a:prstGeom prst="rect">
             <a:avLst/>
@@ -11291,8 +11324,9 @@
             </a:pPr>
             <a:r>
               <a:rPr lang="en-US" b="0" dirty="0" smtClean="0"/>
-              <a:t>Subscribe Request Channel</a:t>
-            </a:r>
+              <a:t>Open Read Request Session</a:t>
+            </a:r>
+            <a:endParaRPr lang="en-US" b="0" dirty="0" smtClean="0"/>
           </a:p>
           <a:p>
             <a:pPr>
@@ -11302,8 +11336,13 @@
             </a:pPr>
             <a:r>
               <a:rPr lang="en-US" b="0" dirty="0" smtClean="0"/>
-              <a:t>Notify Listener (callback)</a:t>
-            </a:r>
+              <a:t>Notify </a:t>
+            </a:r>
+            <a:r>
+              <a:rPr lang="en-US" b="0" dirty="0" smtClean="0"/>
+              <a:t>Listener</a:t>
+            </a:r>
+            <a:endParaRPr lang="en-US" b="0" dirty="0" smtClean="0"/>
           </a:p>
           <a:p>
             <a:pPr>
@@ -11335,8 +11374,9 @@
             </a:pPr>
             <a:r>
               <a:rPr lang="en-US" b="0" dirty="0" smtClean="0"/>
-              <a:t>Open Response Channel</a:t>
-            </a:r>
+              <a:t>Close Read Request Session</a:t>
+            </a:r>
+            <a:endParaRPr lang="en-US" b="0" dirty="0"/>
           </a:p>
           <a:p>
             <a:pPr>
@@ -11346,8 +11386,9 @@
             </a:pPr>
             <a:r>
               <a:rPr lang="en-US" b="0" dirty="0" smtClean="0"/>
-              <a:t>Post Response</a:t>
-            </a:r>
+              <a:t>Open Post Response Session</a:t>
+            </a:r>
+            <a:endParaRPr lang="en-US" b="0" dirty="0" smtClean="0"/>
           </a:p>
           <a:p>
             <a:pPr>
@@ -11357,7 +11398,7 @@
             </a:pPr>
             <a:r>
               <a:rPr lang="en-US" b="0" dirty="0" smtClean="0"/>
-              <a:t>Close Response Channel</a:t>
+              <a:t>Post Response</a:t>
             </a:r>
           </a:p>
           <a:p>
@@ -11368,9 +11409,8 @@
             </a:pPr>
             <a:r>
               <a:rPr lang="en-US" b="0" dirty="0" smtClean="0"/>
-              <a:t>Unsubscribe Request Channel</a:t>
-            </a:r>
-            <a:endParaRPr lang="en-US" b="0" dirty="0"/>
+              <a:t>Close Post Response Session</a:t>
+            </a:r>
           </a:p>
         </p:txBody>
       </p:sp>
@@ -11496,8 +11536,8 @@
         </p:nvSpPr>
         <p:spPr bwMode="auto">
           <a:xfrm>
-            <a:off x="4507671" y="4038600"/>
-            <a:ext cx="3493329" cy="2308324"/>
+            <a:off x="4623152" y="4038600"/>
+            <a:ext cx="3377848" cy="2308324"/>
           </a:xfrm>
           <a:prstGeom prst="rect">
             <a:avLst/>
@@ -11523,8 +11563,13 @@
             </a:pPr>
             <a:r>
               <a:rPr lang="en-US" b="0" dirty="0" smtClean="0"/>
-              <a:t>Open Request Channel</a:t>
-            </a:r>
+              <a:t>Open </a:t>
+            </a:r>
+            <a:r>
+              <a:rPr lang="en-US" b="0" dirty="0" smtClean="0"/>
+              <a:t>Post Request Session</a:t>
+            </a:r>
+            <a:endParaRPr lang="en-US" b="0" dirty="0" smtClean="0"/>
           </a:p>
           <a:p>
             <a:pPr algn="r">
@@ -11533,12 +11578,8 @@
               </a:tabLst>
             </a:pPr>
             <a:r>
-              <a:rPr lang="en-US" b="0" dirty="0" smtClean="0"/>
-              <a:t>Subscribe Response </a:t>
-            </a:r>
-            <a:r>
               <a:rPr lang="en-US" b="0" dirty="0"/>
-              <a:t>Channel</a:t>
+              <a:t>Post Request</a:t>
             </a:r>
           </a:p>
           <a:p>
@@ -11548,9 +11589,14 @@
               </a:tabLst>
             </a:pPr>
             <a:r>
+              <a:rPr lang="en-US" b="0" dirty="0"/>
+              <a:t>Close </a:t>
+            </a:r>
+            <a:r>
               <a:rPr lang="en-US" b="0" dirty="0" smtClean="0"/>
-              <a:t>Post Request</a:t>
-            </a:r>
+              <a:t>Post Request Session</a:t>
+            </a:r>
+            <a:endParaRPr lang="en-US" b="0" dirty="0"/>
           </a:p>
           <a:p>
             <a:pPr algn="r">
@@ -11560,8 +11606,9 @@
             </a:pPr>
             <a:r>
               <a:rPr lang="en-US" b="0" dirty="0" smtClean="0"/>
-              <a:t>Notify Listener (callback)</a:t>
-            </a:r>
+              <a:t>Open Read Response Session</a:t>
+            </a:r>
+            <a:endParaRPr lang="en-US" b="0" dirty="0"/>
           </a:p>
           <a:p>
             <a:pPr algn="r">
@@ -11571,8 +11618,9 @@
             </a:pPr>
             <a:r>
               <a:rPr lang="en-US" b="0" dirty="0" smtClean="0"/>
-              <a:t>Read Response</a:t>
-            </a:r>
+              <a:t>Notify Listener</a:t>
+            </a:r>
+            <a:endParaRPr lang="en-US" b="0" dirty="0" smtClean="0"/>
           </a:p>
           <a:p>
             <a:pPr algn="r">
@@ -11582,9 +11630,8 @@
             </a:pPr>
             <a:r>
               <a:rPr lang="en-US" b="0" dirty="0" smtClean="0"/>
-              <a:t>Remove Response</a:t>
-            </a:r>
-            <a:endParaRPr lang="en-US" b="0" dirty="0"/>
+              <a:t>Read Response</a:t>
+            </a:r>
           </a:p>
           <a:p>
             <a:pPr algn="r">
@@ -11593,13 +11640,10 @@
               </a:tabLst>
             </a:pPr>
             <a:r>
-              <a:rPr lang="en-US" b="0" dirty="0"/>
-              <a:t>Unsubscribe </a:t>
-            </a:r>
-            <a:r>
               <a:rPr lang="en-US" b="0" dirty="0" smtClean="0"/>
-              <a:t>Response Channel</a:t>
-            </a:r>
+              <a:t>Remove Response</a:t>
+            </a:r>
+            <a:endParaRPr lang="en-US" b="0" dirty="0"/>
           </a:p>
           <a:p>
             <a:pPr algn="r">
@@ -11609,9 +11653,8 @@
             </a:pPr>
             <a:r>
               <a:rPr lang="en-US" b="0" dirty="0" smtClean="0"/>
-              <a:t>Close Request Channel</a:t>
-            </a:r>
-            <a:endParaRPr lang="en-US" b="0" dirty="0"/>
+              <a:t>Close Read Response Session</a:t>
+            </a:r>
           </a:p>
         </p:txBody>
       </p:sp>
@@ -12026,8 +12069,8 @@
         </p:nvSpPr>
         <p:spPr bwMode="auto">
           <a:xfrm>
-            <a:off x="5180231" y="2895600"/>
-            <a:ext cx="1515158" cy="246221"/>
+            <a:off x="5045580" y="2877979"/>
+            <a:ext cx="1784464" cy="246221"/>
           </a:xfrm>
           <a:prstGeom prst="rect">
             <a:avLst/>
@@ -12049,7 +12092,11 @@
             <a:pPr algn="ctr"/>
             <a:r>
               <a:rPr lang="en-US" sz="1000" b="0" dirty="0" smtClean="0"/>
-              <a:t>Open Request Channel</a:t>
+              <a:t>Open </a:t>
+            </a:r>
+            <a:r>
+              <a:rPr lang="en-US" sz="1000" b="0" dirty="0" smtClean="0"/>
+              <a:t>Post Request Session</a:t>
             </a:r>
             <a:endParaRPr lang="en-US" sz="1000" b="0" dirty="0"/>
           </a:p>
@@ -12065,7 +12112,7 @@
         </p:nvSpPr>
         <p:spPr bwMode="auto">
           <a:xfrm flipH="1">
-            <a:off x="4794810" y="3090863"/>
+            <a:off x="4794810" y="3124200"/>
             <a:ext cx="2286000" cy="0"/>
           </a:xfrm>
           <a:prstGeom prst="line">
@@ -12135,8 +12182,8 @@
         </p:nvSpPr>
         <p:spPr bwMode="auto">
           <a:xfrm>
-            <a:off x="5172216" y="6019800"/>
-            <a:ext cx="1531188" cy="246221"/>
+            <a:off x="5037565" y="6019800"/>
+            <a:ext cx="1800494" cy="246221"/>
           </a:xfrm>
           <a:prstGeom prst="rect">
             <a:avLst/>
@@ -12158,7 +12205,11 @@
             <a:pPr algn="ctr"/>
             <a:r>
               <a:rPr lang="en-US" sz="1000" b="0" dirty="0" smtClean="0"/>
-              <a:t>Close Request Channel</a:t>
+              <a:t>Close </a:t>
+            </a:r>
+            <a:r>
+              <a:rPr lang="en-US" sz="1000" b="0" dirty="0" smtClean="0"/>
+              <a:t>Post Request Session</a:t>
             </a:r>
             <a:endParaRPr lang="en-US" sz="1000" b="0" dirty="0"/>
           </a:p>
@@ -12242,8 +12293,8 @@
         </p:nvSpPr>
         <p:spPr bwMode="auto">
           <a:xfrm>
-            <a:off x="2308791" y="2514600"/>
-            <a:ext cx="1771639" cy="246221"/>
+            <a:off x="2277534" y="2514600"/>
+            <a:ext cx="1834156" cy="246221"/>
           </a:xfrm>
           <a:prstGeom prst="rect">
             <a:avLst/>
@@ -12265,7 +12316,7 @@
             <a:pPr algn="ctr"/>
             <a:r>
               <a:rPr lang="en-US" sz="1000" b="0" dirty="0" smtClean="0"/>
-              <a:t>Subscribe Request Channel</a:t>
+              <a:t>Open Read Request Session</a:t>
             </a:r>
             <a:endParaRPr lang="en-US" sz="1000" b="0" dirty="0"/>
           </a:p>
@@ -12316,7 +12367,7 @@
         </p:nvSpPr>
         <p:spPr bwMode="auto">
           <a:xfrm flipH="1">
-            <a:off x="4794810" y="3733642"/>
+            <a:off x="4794810" y="3733800"/>
             <a:ext cx="2286000" cy="0"/>
           </a:xfrm>
           <a:prstGeom prst="line">
@@ -12350,7 +12401,7 @@
         </p:nvSpPr>
         <p:spPr bwMode="auto">
           <a:xfrm>
-            <a:off x="5463161" y="3487579"/>
+            <a:off x="5463161" y="3505200"/>
             <a:ext cx="949299" cy="246221"/>
           </a:xfrm>
           <a:prstGeom prst="rect">
@@ -12488,7 +12539,7 @@
         </p:nvSpPr>
         <p:spPr bwMode="auto">
           <a:xfrm>
-            <a:off x="2051610" y="4208463"/>
+            <a:off x="2051610" y="4267200"/>
             <a:ext cx="2286000" cy="0"/>
           </a:xfrm>
           <a:prstGeom prst="line">
@@ -12522,7 +12573,7 @@
         </p:nvSpPr>
         <p:spPr bwMode="auto">
           <a:xfrm>
-            <a:off x="2695115" y="3962400"/>
+            <a:off x="2695115" y="4020979"/>
             <a:ext cx="998991" cy="246221"/>
           </a:xfrm>
           <a:prstGeom prst="rect">
@@ -12561,7 +12612,7 @@
         </p:nvSpPr>
         <p:spPr bwMode="auto">
           <a:xfrm>
-            <a:off x="2051610" y="4437063"/>
+            <a:off x="2051610" y="4572000"/>
             <a:ext cx="2286000" cy="0"/>
           </a:xfrm>
           <a:prstGeom prst="line">
@@ -12595,7 +12646,7 @@
         </p:nvSpPr>
         <p:spPr bwMode="auto">
           <a:xfrm>
-            <a:off x="2609354" y="4208463"/>
+            <a:off x="2609354" y="4325779"/>
             <a:ext cx="1170513" cy="246221"/>
           </a:xfrm>
           <a:prstGeom prst="rect">
@@ -12638,7 +12689,7 @@
         </p:nvSpPr>
         <p:spPr bwMode="auto">
           <a:xfrm>
-            <a:off x="2051610" y="4953000"/>
+            <a:off x="2051610" y="5181600"/>
             <a:ext cx="2286000" cy="0"/>
           </a:xfrm>
           <a:prstGeom prst="line">
@@ -12672,7 +12723,7 @@
         </p:nvSpPr>
         <p:spPr bwMode="auto">
           <a:xfrm>
-            <a:off x="2670268" y="4724400"/>
+            <a:off x="2670268" y="4935379"/>
             <a:ext cx="1048685" cy="246221"/>
           </a:xfrm>
           <a:prstGeom prst="rect">
@@ -12789,8 +12840,8 @@
         </p:nvSpPr>
         <p:spPr bwMode="auto">
           <a:xfrm>
-            <a:off x="4331820" y="4953000"/>
-            <a:ext cx="457200" cy="228600"/>
+            <a:off x="4337610" y="4876800"/>
+            <a:ext cx="451410" cy="304800"/>
           </a:xfrm>
           <a:prstGeom prst="line">
             <a:avLst/>
@@ -12974,8 +13025,8 @@
         </p:nvSpPr>
         <p:spPr bwMode="auto">
           <a:xfrm>
-            <a:off x="5002297" y="3124200"/>
-            <a:ext cx="1871026" cy="246221"/>
+            <a:off x="4971041" y="3182779"/>
+            <a:ext cx="1933543" cy="246221"/>
           </a:xfrm>
           <a:prstGeom prst="rect">
             <a:avLst/>
@@ -12997,7 +13048,15 @@
             <a:pPr algn="ctr"/>
             <a:r>
               <a:rPr lang="en-US" sz="1000" b="0" dirty="0" smtClean="0"/>
-              <a:t>Subscribe Response Channel</a:t>
+              <a:t>Ope</a:t>
+            </a:r>
+            <a:r>
+              <a:rPr lang="en-US" sz="1000" b="0" dirty="0" smtClean="0"/>
+              <a:t>n Read </a:t>
+            </a:r>
+            <a:r>
+              <a:rPr lang="en-US" sz="1000" b="0" dirty="0" smtClean="0"/>
+              <a:t>Response Session</a:t>
             </a:r>
             <a:endParaRPr lang="en-US" sz="1000" b="0" dirty="0"/>
           </a:p>
@@ -13013,7 +13072,7 @@
         </p:nvSpPr>
         <p:spPr bwMode="auto">
           <a:xfrm flipH="1">
-            <a:off x="4794810" y="3319463"/>
+            <a:off x="4794810" y="3429000"/>
             <a:ext cx="2286000" cy="0"/>
           </a:xfrm>
           <a:prstGeom prst="line">
@@ -13047,8 +13106,8 @@
         </p:nvSpPr>
         <p:spPr bwMode="auto">
           <a:xfrm>
-            <a:off x="4930964" y="5773738"/>
-            <a:ext cx="2013693" cy="246221"/>
+            <a:off x="4963026" y="5773738"/>
+            <a:ext cx="1949573" cy="246221"/>
           </a:xfrm>
           <a:prstGeom prst="rect">
             <a:avLst/>
@@ -13069,17 +13128,10 @@
           <a:p>
             <a:pPr algn="ctr"/>
             <a:r>
-              <a:rPr lang="en-US" sz="1000" b="0" dirty="0"/>
-              <a:t>Unsubscribe </a:t>
-            </a:r>
-            <a:r>
               <a:rPr lang="en-US" sz="1000" b="0" dirty="0" smtClean="0"/>
-              <a:t>Response </a:t>
-            </a:r>
-            <a:r>
-              <a:rPr lang="en-US" sz="1000" b="0" dirty="0"/>
-              <a:t>Channel</a:t>
-            </a:r>
+              <a:t>Close Read Response Session</a:t>
+            </a:r>
+            <a:endParaRPr lang="en-US" sz="1000" b="0" dirty="0"/>
           </a:p>
         </p:txBody>
       </p:sp>
@@ -13114,6 +13166,152 @@
           <a:lstStyle/>
           <a:p>
             <a:endParaRPr lang="en-US"/>
+          </a:p>
+        </p:txBody>
+      </p:sp>
+      <p:sp>
+        <p:nvSpPr>
+          <p:cNvPr id="40" name="Line 78"/>
+          <p:cNvSpPr>
+            <a:spLocks noChangeShapeType="1"/>
+          </p:cNvSpPr>
+          <p:nvPr/>
+        </p:nvSpPr>
+        <p:spPr bwMode="auto">
+          <a:xfrm>
+            <a:off x="2057400" y="4876800"/>
+            <a:ext cx="2286000" cy="0"/>
+          </a:xfrm>
+          <a:prstGeom prst="line">
+            <a:avLst/>
+          </a:prstGeom>
+          <a:noFill/>
+          <a:ln w="9525">
+            <a:solidFill>
+              <a:schemeClr val="tx1"/>
+            </a:solidFill>
+            <a:round/>
+            <a:headEnd/>
+            <a:tailEnd type="triangle" w="med" len="med"/>
+          </a:ln>
+        </p:spPr>
+        <p:txBody>
+          <a:bodyPr/>
+          <a:lstStyle/>
+          <a:p>
+            <a:endParaRPr lang="en-US"/>
+          </a:p>
+        </p:txBody>
+      </p:sp>
+      <p:sp>
+        <p:nvSpPr>
+          <p:cNvPr id="41" name="Text Box 79"/>
+          <p:cNvSpPr txBox="1">
+            <a:spLocks noChangeArrowheads="1"/>
+          </p:cNvSpPr>
+          <p:nvPr/>
+        </p:nvSpPr>
+        <p:spPr bwMode="auto">
+          <a:xfrm>
+            <a:off x="2258478" y="4630579"/>
+            <a:ext cx="1883850" cy="246221"/>
+          </a:xfrm>
+          <a:prstGeom prst="rect">
+            <a:avLst/>
+          </a:prstGeom>
+          <a:noFill/>
+          <a:ln w="9525">
+            <a:noFill/>
+            <a:miter lim="800000"/>
+            <a:headEnd/>
+            <a:tailEnd/>
+          </a:ln>
+        </p:spPr>
+        <p:txBody>
+          <a:bodyPr wrap="none">
+            <a:spAutoFit/>
+          </a:bodyPr>
+          <a:lstStyle/>
+          <a:p>
+            <a:pPr algn="ctr"/>
+            <a:r>
+              <a:rPr lang="en-US" sz="1000" b="0" dirty="0" smtClean="0"/>
+              <a:t>Open Post Response Session</a:t>
+            </a:r>
+            <a:endParaRPr lang="en-US" sz="1000" b="0" dirty="0"/>
+          </a:p>
+        </p:txBody>
+      </p:sp>
+      <p:sp>
+        <p:nvSpPr>
+          <p:cNvPr id="42" name="Line 78"/>
+          <p:cNvSpPr>
+            <a:spLocks noChangeShapeType="1"/>
+          </p:cNvSpPr>
+          <p:nvPr/>
+        </p:nvSpPr>
+        <p:spPr bwMode="auto">
+          <a:xfrm>
+            <a:off x="2057400" y="5486400"/>
+            <a:ext cx="2286000" cy="0"/>
+          </a:xfrm>
+          <a:prstGeom prst="line">
+            <a:avLst/>
+          </a:prstGeom>
+          <a:noFill/>
+          <a:ln w="9525">
+            <a:solidFill>
+              <a:schemeClr val="tx1"/>
+            </a:solidFill>
+            <a:round/>
+            <a:headEnd/>
+            <a:tailEnd type="triangle" w="med" len="med"/>
+          </a:ln>
+        </p:spPr>
+        <p:txBody>
+          <a:bodyPr/>
+          <a:lstStyle/>
+          <a:p>
+            <a:endParaRPr lang="en-US"/>
+          </a:p>
+        </p:txBody>
+      </p:sp>
+      <p:sp>
+        <p:nvSpPr>
+          <p:cNvPr id="43" name="Text Box 79"/>
+          <p:cNvSpPr txBox="1">
+            <a:spLocks noChangeArrowheads="1"/>
+          </p:cNvSpPr>
+          <p:nvPr/>
+        </p:nvSpPr>
+        <p:spPr bwMode="auto">
+          <a:xfrm>
+            <a:off x="2250463" y="5240179"/>
+            <a:ext cx="1899880" cy="246221"/>
+          </a:xfrm>
+          <a:prstGeom prst="rect">
+            <a:avLst/>
+          </a:prstGeom>
+          <a:noFill/>
+          <a:ln w="9525">
+            <a:noFill/>
+            <a:miter lim="800000"/>
+            <a:headEnd/>
+            <a:tailEnd/>
+          </a:ln>
+        </p:spPr>
+        <p:txBody>
+          <a:bodyPr wrap="none">
+            <a:spAutoFit/>
+          </a:bodyPr>
+          <a:lstStyle/>
+          <a:p>
+            <a:pPr algn="ctr"/>
+            <a:r>
+              <a:rPr lang="en-US" sz="1000" b="0" dirty="0" smtClean="0"/>
+              <a:t>Close Post Response Session</a:t>
+            </a:r>
+            <a:endParaRPr lang="en-US" sz="1000" b="0" dirty="0"/>
           </a:p>
         </p:txBody>
       </p:sp>
@@ -13466,8 +13664,8 @@
         </p:nvSpPr>
         <p:spPr bwMode="auto">
           <a:xfrm>
-            <a:off x="5180231" y="2895600"/>
-            <a:ext cx="1515158" cy="246221"/>
+            <a:off x="5045580" y="2895600"/>
+            <a:ext cx="1784464" cy="246221"/>
           </a:xfrm>
           <a:prstGeom prst="rect">
             <a:avLst/>
@@ -13489,7 +13687,11 @@
             <a:pPr algn="ctr"/>
             <a:r>
               <a:rPr lang="en-US" sz="1000" b="0" dirty="0" smtClean="0"/>
-              <a:t>Open Request Channel</a:t>
+              <a:t>Open </a:t>
+            </a:r>
+            <a:r>
+              <a:rPr lang="en-US" sz="1000" b="0" dirty="0" smtClean="0"/>
+              <a:t>Post Request Session</a:t>
             </a:r>
             <a:endParaRPr lang="en-US" sz="1000" b="0" dirty="0"/>
           </a:p>
@@ -13575,8 +13777,8 @@
         </p:nvSpPr>
         <p:spPr bwMode="auto">
           <a:xfrm>
-            <a:off x="5172216" y="5656262"/>
-            <a:ext cx="1531188" cy="246221"/>
+            <a:off x="5037565" y="5656262"/>
+            <a:ext cx="1800494" cy="246221"/>
           </a:xfrm>
           <a:prstGeom prst="rect">
             <a:avLst/>
@@ -13598,7 +13800,11 @@
             <a:pPr algn="ctr"/>
             <a:r>
               <a:rPr lang="en-US" sz="1000" b="0" dirty="0" smtClean="0"/>
-              <a:t>Close Request Channel</a:t>
+              <a:t>Close </a:t>
+            </a:r>
+            <a:r>
+              <a:rPr lang="en-US" sz="1000" b="0" dirty="0" smtClean="0"/>
+              <a:t>Post Request Session</a:t>
             </a:r>
             <a:endParaRPr lang="en-US" sz="1000" b="0" dirty="0"/>
           </a:p>
@@ -13682,8 +13888,8 @@
         </p:nvSpPr>
         <p:spPr bwMode="auto">
           <a:xfrm>
-            <a:off x="2308791" y="2514600"/>
-            <a:ext cx="1771639" cy="246221"/>
+            <a:off x="2277534" y="2514600"/>
+            <a:ext cx="1834156" cy="246221"/>
           </a:xfrm>
           <a:prstGeom prst="rect">
             <a:avLst/>
@@ -13705,7 +13911,7 @@
             <a:pPr algn="ctr"/>
             <a:r>
               <a:rPr lang="en-US" sz="1000" b="0" dirty="0" smtClean="0"/>
-              <a:t>Subscribe Request Channel</a:t>
+              <a:t>Open Read Request Session</a:t>
             </a:r>
             <a:endParaRPr lang="en-US" sz="1000" b="0" dirty="0"/>
           </a:p>
@@ -13969,7 +14175,7 @@
         </p:nvSpPr>
         <p:spPr bwMode="auto">
           <a:xfrm>
-            <a:off x="2051610" y="4953000"/>
+            <a:off x="2051610" y="5029200"/>
             <a:ext cx="2286000" cy="0"/>
           </a:xfrm>
           <a:prstGeom prst="line">
@@ -14003,7 +14209,7 @@
         </p:nvSpPr>
         <p:spPr bwMode="auto">
           <a:xfrm>
-            <a:off x="2670268" y="4724400"/>
+            <a:off x="2670268" y="4782979"/>
             <a:ext cx="1048685" cy="246221"/>
           </a:xfrm>
           <a:prstGeom prst="rect">
@@ -14231,8 +14437,8 @@
         </p:nvSpPr>
         <p:spPr bwMode="auto">
           <a:xfrm>
-            <a:off x="5002297" y="3124200"/>
-            <a:ext cx="1871026" cy="246221"/>
+            <a:off x="4971041" y="3124200"/>
+            <a:ext cx="1933543" cy="246221"/>
           </a:xfrm>
           <a:prstGeom prst="rect">
             <a:avLst/>
@@ -14254,7 +14460,7 @@
             <a:pPr algn="ctr"/>
             <a:r>
               <a:rPr lang="en-US" sz="1000" b="0" dirty="0" smtClean="0"/>
-              <a:t>Subscribe Response Channel</a:t>
+              <a:t>Open Read Response Session</a:t>
             </a:r>
             <a:endParaRPr lang="en-US" sz="1000" b="0" dirty="0"/>
           </a:p>
@@ -14304,8 +14510,8 @@
         </p:nvSpPr>
         <p:spPr bwMode="auto">
           <a:xfrm>
-            <a:off x="4930964" y="5410200"/>
-            <a:ext cx="2013693" cy="246221"/>
+            <a:off x="4963025" y="5410200"/>
+            <a:ext cx="1949573" cy="246221"/>
           </a:xfrm>
           <a:prstGeom prst="rect">
             <a:avLst/>
@@ -14326,17 +14532,10 @@
           <a:p>
             <a:pPr algn="ctr"/>
             <a:r>
-              <a:rPr lang="en-US" sz="1000" b="0" dirty="0"/>
-              <a:t>Unsubscribe </a:t>
-            </a:r>
-            <a:r>
               <a:rPr lang="en-US" sz="1000" b="0" dirty="0" smtClean="0"/>
-              <a:t>Response </a:t>
-            </a:r>
-            <a:r>
-              <a:rPr lang="en-US" sz="1000" b="0" dirty="0"/>
-              <a:t>Channel</a:t>
-            </a:r>
+              <a:t>Close Read Response Session</a:t>
+            </a:r>
+            <a:endParaRPr lang="en-US" sz="1000" b="0" dirty="0"/>
           </a:p>
         </p:txBody>
       </p:sp>
@@ -14735,6 +14934,152 @@
             <a:r>
               <a:rPr lang="en-US" sz="1000" b="0" dirty="0" smtClean="0"/>
               <a:t>(no message returned)</a:t>
+            </a:r>
+            <a:endParaRPr lang="en-US" sz="1000" b="0" dirty="0"/>
+          </a:p>
+        </p:txBody>
+      </p:sp>
+      <p:sp>
+        <p:nvSpPr>
+          <p:cNvPr id="52" name="Line 78"/>
+          <p:cNvSpPr>
+            <a:spLocks noChangeShapeType="1"/>
+          </p:cNvSpPr>
+          <p:nvPr/>
+        </p:nvSpPr>
+        <p:spPr bwMode="auto">
+          <a:xfrm>
+            <a:off x="2057400" y="4724400"/>
+            <a:ext cx="2286000" cy="0"/>
+          </a:xfrm>
+          <a:prstGeom prst="line">
+            <a:avLst/>
+          </a:prstGeom>
+          <a:noFill/>
+          <a:ln w="9525">
+            <a:solidFill>
+              <a:schemeClr val="tx1"/>
+            </a:solidFill>
+            <a:round/>
+            <a:headEnd/>
+            <a:tailEnd type="triangle" w="med" len="med"/>
+          </a:ln>
+        </p:spPr>
+        <p:txBody>
+          <a:bodyPr/>
+          <a:lstStyle/>
+          <a:p>
+            <a:endParaRPr lang="en-US"/>
+          </a:p>
+        </p:txBody>
+      </p:sp>
+      <p:sp>
+        <p:nvSpPr>
+          <p:cNvPr id="53" name="Text Box 79"/>
+          <p:cNvSpPr txBox="1">
+            <a:spLocks noChangeArrowheads="1"/>
+          </p:cNvSpPr>
+          <p:nvPr/>
+        </p:nvSpPr>
+        <p:spPr bwMode="auto">
+          <a:xfrm>
+            <a:off x="2258478" y="4478179"/>
+            <a:ext cx="1883850" cy="246221"/>
+          </a:xfrm>
+          <a:prstGeom prst="rect">
+            <a:avLst/>
+          </a:prstGeom>
+          <a:noFill/>
+          <a:ln w="9525">
+            <a:noFill/>
+            <a:miter lim="800000"/>
+            <a:headEnd/>
+            <a:tailEnd/>
+          </a:ln>
+        </p:spPr>
+        <p:txBody>
+          <a:bodyPr wrap="none">
+            <a:spAutoFit/>
+          </a:bodyPr>
+          <a:lstStyle/>
+          <a:p>
+            <a:pPr algn="ctr"/>
+            <a:r>
+              <a:rPr lang="en-US" sz="1000" b="0" dirty="0" smtClean="0"/>
+              <a:t>Open Post Response Session</a:t>
+            </a:r>
+            <a:endParaRPr lang="en-US" sz="1000" b="0" dirty="0"/>
+          </a:p>
+        </p:txBody>
+      </p:sp>
+      <p:sp>
+        <p:nvSpPr>
+          <p:cNvPr id="54" name="Line 78"/>
+          <p:cNvSpPr>
+            <a:spLocks noChangeShapeType="1"/>
+          </p:cNvSpPr>
+          <p:nvPr/>
+        </p:nvSpPr>
+        <p:spPr bwMode="auto">
+          <a:xfrm>
+            <a:off x="2057400" y="5334000"/>
+            <a:ext cx="2286000" cy="0"/>
+          </a:xfrm>
+          <a:prstGeom prst="line">
+            <a:avLst/>
+          </a:prstGeom>
+          <a:noFill/>
+          <a:ln w="9525">
+            <a:solidFill>
+              <a:schemeClr val="tx1"/>
+            </a:solidFill>
+            <a:round/>
+            <a:headEnd/>
+            <a:tailEnd type="triangle" w="med" len="med"/>
+          </a:ln>
+        </p:spPr>
+        <p:txBody>
+          <a:bodyPr/>
+          <a:lstStyle/>
+          <a:p>
+            <a:endParaRPr lang="en-US"/>
+          </a:p>
+        </p:txBody>
+      </p:sp>
+      <p:sp>
+        <p:nvSpPr>
+          <p:cNvPr id="55" name="Text Box 79"/>
+          <p:cNvSpPr txBox="1">
+            <a:spLocks noChangeArrowheads="1"/>
+          </p:cNvSpPr>
+          <p:nvPr/>
+        </p:nvSpPr>
+        <p:spPr bwMode="auto">
+          <a:xfrm>
+            <a:off x="2250463" y="5087779"/>
+            <a:ext cx="1899880" cy="246221"/>
+          </a:xfrm>
+          <a:prstGeom prst="rect">
+            <a:avLst/>
+          </a:prstGeom>
+          <a:noFill/>
+          <a:ln w="9525">
+            <a:noFill/>
+            <a:miter lim="800000"/>
+            <a:headEnd/>
+            <a:tailEnd/>
+          </a:ln>
+        </p:spPr>
+        <p:txBody>
+          <a:bodyPr wrap="none">
+            <a:spAutoFit/>
+          </a:bodyPr>
+          <a:lstStyle/>
+          <a:p>
+            <a:pPr algn="ctr"/>
+            <a:r>
+              <a:rPr lang="en-US" sz="1000" b="0" dirty="0" smtClean="0"/>
+              <a:t>Close Post Response Session</a:t>
             </a:r>
             <a:endParaRPr lang="en-US" sz="1000" b="0" dirty="0"/>
           </a:p>
@@ -15157,8 +15502,8 @@
         </p:nvSpPr>
         <p:spPr bwMode="auto">
           <a:xfrm>
-            <a:off x="3375035" y="2014537"/>
-            <a:ext cx="1771639" cy="246221"/>
+            <a:off x="3343777" y="2014537"/>
+            <a:ext cx="1834156" cy="246221"/>
           </a:xfrm>
           <a:prstGeom prst="rect">
             <a:avLst/>
@@ -15180,7 +15525,7 @@
             <a:pPr algn="ctr"/>
             <a:r>
               <a:rPr lang="en-US" sz="1000" b="0" dirty="0" smtClean="0"/>
-              <a:t>Subscribe Request Channel</a:t>
+              <a:t>Open Read Request Session</a:t>
             </a:r>
             <a:endParaRPr lang="en-US" sz="1000" b="0" dirty="0"/>
           </a:p>
@@ -15311,8 +15656,8 @@
         </p:nvSpPr>
         <p:spPr bwMode="auto">
           <a:xfrm>
-            <a:off x="939805" y="2774950"/>
-            <a:ext cx="1771640" cy="246221"/>
+            <a:off x="908549" y="2774950"/>
+            <a:ext cx="1834156" cy="246221"/>
           </a:xfrm>
           <a:prstGeom prst="rect">
             <a:avLst/>
@@ -15333,9 +15678,10 @@
           <a:p>
             <a:pPr algn="ctr"/>
             <a:r>
-              <a:rPr lang="en-US" sz="1000" b="0" dirty="0"/>
-              <a:t>Subscribe Request Channel</a:t>
-            </a:r>
+              <a:rPr lang="en-US" sz="1000" b="0" dirty="0" smtClean="0"/>
+              <a:t>Open Read Request Session</a:t>
+            </a:r>
+            <a:endParaRPr lang="en-US" sz="1000" b="0" dirty="0"/>
           </a:p>
         </p:txBody>
       </p:sp>
@@ -15383,8 +15729,8 @@
         </p:nvSpPr>
         <p:spPr bwMode="auto">
           <a:xfrm>
-            <a:off x="6249646" y="3048000"/>
-            <a:ext cx="1515158" cy="246221"/>
+            <a:off x="6114995" y="3048000"/>
+            <a:ext cx="1784464" cy="246221"/>
           </a:xfrm>
           <a:prstGeom prst="rect">
             <a:avLst/>
@@ -15406,7 +15752,11 @@
             <a:pPr algn="ctr"/>
             <a:r>
               <a:rPr lang="en-US" sz="1000" b="0" dirty="0" smtClean="0"/>
-              <a:t>Open Request Channel</a:t>
+              <a:t>Open </a:t>
+            </a:r>
+            <a:r>
+              <a:rPr lang="en-US" sz="1000" b="0" dirty="0" smtClean="0"/>
+              <a:t>Post Request Session</a:t>
             </a:r>
             <a:endParaRPr lang="en-US" sz="1000" b="0" dirty="0"/>
           </a:p>
@@ -15458,7 +15808,7 @@
         </p:nvSpPr>
         <p:spPr bwMode="auto">
           <a:xfrm flipH="1">
-            <a:off x="990600" y="5087937"/>
+            <a:off x="990600" y="5181600"/>
             <a:ext cx="4413250" cy="0"/>
           </a:xfrm>
           <a:prstGeom prst="line">
@@ -15492,7 +15842,7 @@
         </p:nvSpPr>
         <p:spPr bwMode="auto">
           <a:xfrm>
-            <a:off x="1301284" y="4892674"/>
+            <a:off x="1301284" y="4935379"/>
             <a:ext cx="1048685" cy="246221"/>
           </a:xfrm>
           <a:prstGeom prst="rect">
@@ -15594,8 +15944,8 @@
         </p:nvSpPr>
         <p:spPr bwMode="auto">
           <a:xfrm>
-            <a:off x="6433190" y="4724400"/>
-            <a:ext cx="1148071" cy="246221"/>
+            <a:off x="6458037" y="4724400"/>
+            <a:ext cx="1098379" cy="246221"/>
           </a:xfrm>
           <a:prstGeom prst="rect">
             <a:avLst/>
@@ -15620,9 +15970,10 @@
               <a:t>Read </a:t>
             </a:r>
             <a:r>
-              <a:rPr lang="en-US" sz="1000" b="0" dirty="0"/>
-              <a:t>Publication</a:t>
-            </a:r>
+              <a:rPr lang="en-US" sz="1000" b="0" dirty="0" smtClean="0"/>
+              <a:t>Response</a:t>
+            </a:r>
+            <a:endParaRPr lang="en-US" sz="1000" b="0" dirty="0"/>
           </a:p>
         </p:txBody>
       </p:sp>
@@ -15670,8 +16021,8 @@
         </p:nvSpPr>
         <p:spPr bwMode="auto">
           <a:xfrm>
-            <a:off x="6347619" y="5545137"/>
-            <a:ext cx="1319213" cy="246063"/>
+            <a:off x="6372276" y="5545137"/>
+            <a:ext cx="1269899" cy="246221"/>
           </a:xfrm>
           <a:prstGeom prst="rect">
             <a:avLst/>
@@ -15693,8 +16044,13 @@
             <a:pPr algn="ctr"/>
             <a:r>
               <a:rPr lang="en-US" sz="1000" b="0" dirty="0"/>
-              <a:t>Remove Publication</a:t>
-            </a:r>
+              <a:t>Remove </a:t>
+            </a:r>
+            <a:r>
+              <a:rPr lang="en-US" sz="1000" b="0" dirty="0" smtClean="0"/>
+              <a:t>Response</a:t>
+            </a:r>
+            <a:endParaRPr lang="en-US" sz="1000" b="0" dirty="0"/>
           </a:p>
         </p:txBody>
       </p:sp>
@@ -15708,8 +16064,8 @@
         </p:nvSpPr>
         <p:spPr bwMode="auto">
           <a:xfrm>
-            <a:off x="5410199" y="5087937"/>
-            <a:ext cx="462055" cy="415926"/>
+            <a:off x="5403851" y="5181599"/>
+            <a:ext cx="468404" cy="322263"/>
           </a:xfrm>
           <a:prstGeom prst="line">
             <a:avLst/>
@@ -15777,8 +16133,8 @@
         </p:nvSpPr>
         <p:spPr bwMode="auto">
           <a:xfrm>
-            <a:off x="6071712" y="3276600"/>
-            <a:ext cx="1871026" cy="246221"/>
+            <a:off x="6040456" y="3276600"/>
+            <a:ext cx="1933543" cy="246221"/>
           </a:xfrm>
           <a:prstGeom prst="rect">
             <a:avLst/>
@@ -15800,7 +16156,7 @@
             <a:pPr algn="ctr"/>
             <a:r>
               <a:rPr lang="en-US" sz="1000" b="0" dirty="0" smtClean="0"/>
-              <a:t>Subscribe Response Channel</a:t>
+              <a:t>Open Read Response Session</a:t>
             </a:r>
             <a:endParaRPr lang="en-US" sz="1000" b="0" dirty="0"/>
           </a:p>
@@ -16182,8 +16538,8 @@
         </p:nvSpPr>
         <p:spPr bwMode="auto">
           <a:xfrm>
-            <a:off x="6433190" y="4191000"/>
-            <a:ext cx="1148071" cy="246221"/>
+            <a:off x="6458037" y="4191000"/>
+            <a:ext cx="1098379" cy="246221"/>
           </a:xfrm>
           <a:prstGeom prst="rect">
             <a:avLst/>
@@ -16208,9 +16564,10 @@
               <a:t>Read </a:t>
             </a:r>
             <a:r>
-              <a:rPr lang="en-US" sz="1000" b="0" dirty="0"/>
-              <a:t>Publication</a:t>
-            </a:r>
+              <a:rPr lang="en-US" sz="1000" b="0" dirty="0" smtClean="0"/>
+              <a:t>Response</a:t>
+            </a:r>
+            <a:endParaRPr lang="en-US" sz="1000" b="0" dirty="0"/>
           </a:p>
         </p:txBody>
       </p:sp>
@@ -16258,8 +16615,8 @@
         </p:nvSpPr>
         <p:spPr bwMode="auto">
           <a:xfrm>
-            <a:off x="6433190" y="5257800"/>
-            <a:ext cx="1148071" cy="246221"/>
+            <a:off x="6458037" y="5257800"/>
+            <a:ext cx="1098379" cy="246221"/>
           </a:xfrm>
           <a:prstGeom prst="rect">
             <a:avLst/>
@@ -16284,9 +16641,10 @@
               <a:t>Read </a:t>
             </a:r>
             <a:r>
-              <a:rPr lang="en-US" sz="1000" b="0" dirty="0"/>
-              <a:t>Publication</a:t>
-            </a:r>
+              <a:rPr lang="en-US" sz="1000" b="0" dirty="0" smtClean="0"/>
+              <a:t>Response</a:t>
+            </a:r>
+            <a:endParaRPr lang="en-US" sz="1000" b="0" dirty="0"/>
           </a:p>
         </p:txBody>
       </p:sp>
@@ -16378,8 +16736,8 @@
         </p:nvSpPr>
         <p:spPr bwMode="auto">
           <a:xfrm>
-            <a:off x="6241631" y="6078379"/>
-            <a:ext cx="1531188" cy="246221"/>
+            <a:off x="6106980" y="6078379"/>
+            <a:ext cx="1800494" cy="246221"/>
           </a:xfrm>
           <a:prstGeom prst="rect">
             <a:avLst/>
@@ -16401,7 +16759,11 @@
             <a:pPr algn="ctr"/>
             <a:r>
               <a:rPr lang="en-US" sz="1000" b="0" dirty="0" smtClean="0"/>
-              <a:t>Close Request Channel</a:t>
+              <a:t>Close </a:t>
+            </a:r>
+            <a:r>
+              <a:rPr lang="en-US" sz="1000" b="0" dirty="0" smtClean="0"/>
+              <a:t>Post Request Session</a:t>
             </a:r>
             <a:endParaRPr lang="en-US" sz="1000" b="0" dirty="0"/>
           </a:p>
@@ -16451,8 +16813,8 @@
         </p:nvSpPr>
         <p:spPr bwMode="auto">
           <a:xfrm>
-            <a:off x="6000379" y="5832317"/>
-            <a:ext cx="2013693" cy="246221"/>
+            <a:off x="6032442" y="5832317"/>
+            <a:ext cx="1949573" cy="246221"/>
           </a:xfrm>
           <a:prstGeom prst="rect">
             <a:avLst/>
@@ -16473,17 +16835,10 @@
           <a:p>
             <a:pPr algn="ctr"/>
             <a:r>
-              <a:rPr lang="en-US" sz="1000" b="0" dirty="0"/>
-              <a:t>Unsubscribe </a:t>
-            </a:r>
-            <a:r>
               <a:rPr lang="en-US" sz="1000" b="0" dirty="0" smtClean="0"/>
-              <a:t>Response </a:t>
-            </a:r>
-            <a:r>
-              <a:rPr lang="en-US" sz="1000" b="0" dirty="0"/>
-              <a:t>Channel</a:t>
-            </a:r>
+              <a:t>Close Read Response Session</a:t>
+            </a:r>
+            <a:endParaRPr lang="en-US" sz="1000" b="0" dirty="0"/>
           </a:p>
         </p:txBody>
       </p:sp>
@@ -16518,6 +16873,152 @@
           <a:lstStyle/>
           <a:p>
             <a:endParaRPr lang="en-US"/>
+          </a:p>
+        </p:txBody>
+      </p:sp>
+      <p:sp>
+        <p:nvSpPr>
+          <p:cNvPr id="49" name="Line 78"/>
+          <p:cNvSpPr>
+            <a:spLocks noChangeShapeType="1"/>
+          </p:cNvSpPr>
+          <p:nvPr/>
+        </p:nvSpPr>
+        <p:spPr bwMode="auto">
+          <a:xfrm>
+            <a:off x="990599" y="4876800"/>
+            <a:ext cx="4424455" cy="0"/>
+          </a:xfrm>
+          <a:prstGeom prst="line">
+            <a:avLst/>
+          </a:prstGeom>
+          <a:noFill/>
+          <a:ln w="9525">
+            <a:solidFill>
+              <a:schemeClr val="tx1"/>
+            </a:solidFill>
+            <a:round/>
+            <a:headEnd/>
+            <a:tailEnd type="triangle" w="med" len="med"/>
+          </a:ln>
+        </p:spPr>
+        <p:txBody>
+          <a:bodyPr/>
+          <a:lstStyle/>
+          <a:p>
+            <a:endParaRPr lang="en-US"/>
+          </a:p>
+        </p:txBody>
+      </p:sp>
+      <p:sp>
+        <p:nvSpPr>
+          <p:cNvPr id="50" name="Text Box 79"/>
+          <p:cNvSpPr txBox="1">
+            <a:spLocks noChangeArrowheads="1"/>
+          </p:cNvSpPr>
+          <p:nvPr/>
+        </p:nvSpPr>
+        <p:spPr bwMode="auto">
+          <a:xfrm>
+            <a:off x="1191678" y="4630579"/>
+            <a:ext cx="1883850" cy="246221"/>
+          </a:xfrm>
+          <a:prstGeom prst="rect">
+            <a:avLst/>
+          </a:prstGeom>
+          <a:noFill/>
+          <a:ln w="9525">
+            <a:noFill/>
+            <a:miter lim="800000"/>
+            <a:headEnd/>
+            <a:tailEnd/>
+          </a:ln>
+        </p:spPr>
+        <p:txBody>
+          <a:bodyPr wrap="none">
+            <a:spAutoFit/>
+          </a:bodyPr>
+          <a:lstStyle/>
+          <a:p>
+            <a:pPr algn="ctr"/>
+            <a:r>
+              <a:rPr lang="en-US" sz="1000" b="0" dirty="0" smtClean="0"/>
+              <a:t>Open Post Response Session</a:t>
+            </a:r>
+            <a:endParaRPr lang="en-US" sz="1000" b="0" dirty="0"/>
+          </a:p>
+        </p:txBody>
+      </p:sp>
+      <p:sp>
+        <p:nvSpPr>
+          <p:cNvPr id="51" name="Line 78"/>
+          <p:cNvSpPr>
+            <a:spLocks noChangeShapeType="1"/>
+          </p:cNvSpPr>
+          <p:nvPr/>
+        </p:nvSpPr>
+        <p:spPr bwMode="auto">
+          <a:xfrm>
+            <a:off x="990599" y="5486400"/>
+            <a:ext cx="4424455" cy="0"/>
+          </a:xfrm>
+          <a:prstGeom prst="line">
+            <a:avLst/>
+          </a:prstGeom>
+          <a:noFill/>
+          <a:ln w="9525">
+            <a:solidFill>
+              <a:schemeClr val="tx1"/>
+            </a:solidFill>
+            <a:round/>
+            <a:headEnd/>
+            <a:tailEnd type="triangle" w="med" len="med"/>
+          </a:ln>
+        </p:spPr>
+        <p:txBody>
+          <a:bodyPr/>
+          <a:lstStyle/>
+          <a:p>
+            <a:endParaRPr lang="en-US"/>
+          </a:p>
+        </p:txBody>
+      </p:sp>
+      <p:sp>
+        <p:nvSpPr>
+          <p:cNvPr id="52" name="Text Box 79"/>
+          <p:cNvSpPr txBox="1">
+            <a:spLocks noChangeArrowheads="1"/>
+          </p:cNvSpPr>
+          <p:nvPr/>
+        </p:nvSpPr>
+        <p:spPr bwMode="auto">
+          <a:xfrm>
+            <a:off x="1183663" y="5240179"/>
+            <a:ext cx="1899880" cy="246221"/>
+          </a:xfrm>
+          <a:prstGeom prst="rect">
+            <a:avLst/>
+          </a:prstGeom>
+          <a:noFill/>
+          <a:ln w="9525">
+            <a:noFill/>
+            <a:miter lim="800000"/>
+            <a:headEnd/>
+            <a:tailEnd/>
+          </a:ln>
+        </p:spPr>
+        <p:txBody>
+          <a:bodyPr wrap="none">
+            <a:spAutoFit/>
+          </a:bodyPr>
+          <a:lstStyle/>
+          <a:p>
+            <a:pPr algn="ctr"/>
+            <a:r>
+              <a:rPr lang="en-US" sz="1000" b="0" dirty="0" smtClean="0"/>
+              <a:t>Close Post Response Session</a:t>
+            </a:r>
+            <a:endParaRPr lang="en-US" sz="1000" b="0" dirty="0"/>
           </a:p>
         </p:txBody>
       </p:sp>
@@ -16938,8 +17439,8 @@
         </p:nvSpPr>
         <p:spPr bwMode="auto">
           <a:xfrm>
-            <a:off x="3429000" y="2014537"/>
-            <a:ext cx="1663700" cy="246063"/>
+            <a:off x="3439151" y="2014537"/>
+            <a:ext cx="1643400" cy="246221"/>
           </a:xfrm>
           <a:prstGeom prst="rect">
             <a:avLst/>
@@ -16961,8 +17462,13 @@
             <a:pPr algn="ctr"/>
             <a:r>
               <a:rPr lang="en-US" sz="1000" b="0" dirty="0"/>
-              <a:t>Open Publication Channel</a:t>
-            </a:r>
+              <a:t>Open Publication </a:t>
+            </a:r>
+            <a:r>
+              <a:rPr lang="en-US" sz="1000" b="0" dirty="0" smtClean="0"/>
+              <a:t>Session</a:t>
+            </a:r>
+            <a:endParaRPr lang="en-US" sz="1000" b="0" dirty="0"/>
           </a:p>
         </p:txBody>
       </p:sp>
@@ -17163,8 +17669,8 @@
         </p:nvSpPr>
         <p:spPr bwMode="auto">
           <a:xfrm>
-            <a:off x="993775" y="2774950"/>
-            <a:ext cx="1663700" cy="246062"/>
+            <a:off x="1003926" y="2774950"/>
+            <a:ext cx="1643400" cy="246221"/>
           </a:xfrm>
           <a:prstGeom prst="rect">
             <a:avLst/>
@@ -17186,8 +17692,13 @@
             <a:pPr algn="ctr"/>
             <a:r>
               <a:rPr lang="en-US" sz="1000" b="0" dirty="0"/>
-              <a:t>Open Publication Channel</a:t>
-            </a:r>
+              <a:t>Open Publication </a:t>
+            </a:r>
+            <a:r>
+              <a:rPr lang="en-US" sz="1000" b="0" dirty="0" smtClean="0"/>
+              <a:t>Session</a:t>
+            </a:r>
+            <a:endParaRPr lang="en-US" sz="1000" b="0" dirty="0"/>
           </a:p>
         </p:txBody>
       </p:sp>
@@ -17273,8 +17784,8 @@
         </p:nvSpPr>
         <p:spPr bwMode="auto">
           <a:xfrm>
-            <a:off x="6044407" y="3048000"/>
-            <a:ext cx="1919287" cy="246062"/>
+            <a:off x="6143080" y="3048000"/>
+            <a:ext cx="1721946" cy="246221"/>
           </a:xfrm>
           <a:prstGeom prst="rect">
             <a:avLst/>
@@ -17295,9 +17806,14 @@
           <a:p>
             <a:pPr algn="ctr"/>
             <a:r>
-              <a:rPr lang="en-US" sz="1000" b="0" dirty="0"/>
-              <a:t>Subscribe Publication Channel</a:t>
-            </a:r>
+              <a:rPr lang="en-US" sz="1000" b="0" dirty="0" smtClean="0"/>
+              <a:t>Open </a:t>
+            </a:r>
+            <a:r>
+              <a:rPr lang="en-US" sz="1000" b="0" dirty="0" smtClean="0"/>
+              <a:t>Subscription Session</a:t>
+            </a:r>
+            <a:endParaRPr lang="en-US" sz="1000" b="0" dirty="0"/>
           </a:p>
         </p:txBody>
       </p:sp>
@@ -17369,7 +17885,7 @@
           <a:p>
             <a:pPr algn="ctr"/>
             <a:r>
-              <a:rPr lang="en-US" sz="1000" b="0" dirty="0"/>
+              <a:rPr lang="en-US" sz="1000" b="0" i="1" dirty="0"/>
               <a:t>Finish Post Publication</a:t>
             </a:r>
           </a:p>
@@ -17747,18 +18263,18 @@
           <a:p>
             <a:pPr algn="ctr"/>
             <a:r>
-              <a:rPr lang="en-US" sz="1000" b="0" dirty="0" smtClean="0"/>
+              <a:rPr lang="en-US" sz="1000" b="0" i="1" dirty="0" smtClean="0"/>
               <a:t>Finish</a:t>
             </a:r>
             <a:br>
-              <a:rPr lang="en-US" sz="1000" b="0" dirty="0" smtClean="0"/>
+              <a:rPr lang="en-US" sz="1000" b="0" i="1" dirty="0" smtClean="0"/>
             </a:br>
             <a:r>
-              <a:rPr lang="en-US" sz="1000" b="0" dirty="0" smtClean="0"/>
+              <a:rPr lang="en-US" sz="1000" b="0" i="1" dirty="0" smtClean="0"/>
               <a:t>Post </a:t>
             </a:r>
             <a:r>
-              <a:rPr lang="en-US" sz="1000" b="0" dirty="0"/>
+              <a:rPr lang="en-US" sz="1000" b="0" i="1" dirty="0"/>
               <a:t>Publication</a:t>
             </a:r>
           </a:p>
@@ -35461,11 +35977,7 @@
             </a:pPr>
             <a:r>
               <a:rPr lang="en-US" b="0" dirty="0" smtClean="0"/>
-              <a:t>Create </a:t>
-            </a:r>
-            <a:r>
-              <a:rPr lang="en-US" b="0" dirty="0" smtClean="0"/>
-              <a:t>Channel</a:t>
+              <a:t>Create Channel</a:t>
             </a:r>
           </a:p>
           <a:p>
@@ -35661,8 +36173,8 @@
         </p:nvSpPr>
         <p:spPr bwMode="auto">
           <a:xfrm>
-            <a:off x="6072267" y="4038600"/>
-            <a:ext cx="1928733" cy="2031325"/>
+            <a:off x="6396971" y="4038600"/>
+            <a:ext cx="1604029" cy="1754326"/>
           </a:xfrm>
           <a:prstGeom prst="rect">
             <a:avLst/>
@@ -35688,8 +36200,13 @@
             </a:pPr>
             <a:r>
               <a:rPr lang="en-US" b="0" dirty="0"/>
-              <a:t>Get All Channels</a:t>
-            </a:r>
+              <a:t>Get </a:t>
+            </a:r>
+            <a:r>
+              <a:rPr lang="en-US" b="0" dirty="0" smtClean="0"/>
+              <a:t>Channel</a:t>
+            </a:r>
+            <a:endParaRPr lang="en-US" b="0" dirty="0"/>
           </a:p>
           <a:p>
             <a:pPr algn="r">
@@ -35698,8 +36215,8 @@
               </a:tabLst>
             </a:pPr>
             <a:r>
-              <a:rPr lang="en-US" b="0" dirty="0"/>
-              <a:t>Get All Sessions</a:t>
+              <a:rPr lang="en-US" b="0" dirty="0" smtClean="0"/>
+              <a:t>Get Channels</a:t>
             </a:r>
           </a:p>
           <a:p>
@@ -35710,8 +36227,13 @@
             </a:pPr>
             <a:r>
               <a:rPr lang="en-US" b="0" dirty="0"/>
-              <a:t>Get All Topics</a:t>
-            </a:r>
+              <a:t>Get </a:t>
+            </a:r>
+            <a:r>
+              <a:rPr lang="en-US" b="0" dirty="0" smtClean="0"/>
+              <a:t>Session</a:t>
+            </a:r>
+            <a:endParaRPr lang="en-US" b="0" dirty="0" smtClean="0"/>
           </a:p>
           <a:p>
             <a:pPr algn="r">
@@ -35721,8 +36243,9 @@
             </a:pPr>
             <a:r>
               <a:rPr lang="en-US" b="0" dirty="0" smtClean="0"/>
-              <a:t>Get All Users</a:t>
-            </a:r>
+              <a:t>Get Sessions</a:t>
+            </a:r>
+            <a:endParaRPr lang="en-US" b="0" dirty="0"/>
           </a:p>
           <a:p>
             <a:pPr algn="r">
@@ -35731,13 +36254,14 @@
               </a:tabLst>
             </a:pPr>
             <a:r>
+              <a:rPr lang="en-US" b="0" dirty="0"/>
+              <a:t>Get </a:t>
+            </a:r>
+            <a:r>
               <a:rPr lang="en-US" b="0" dirty="0" smtClean="0"/>
-              <a:t>Get </a:t>
-            </a:r>
-            <a:r>
-              <a:rPr lang="en-US" b="0" dirty="0"/>
-              <a:t>Channel Info</a:t>
-            </a:r>
+              <a:t>Topic</a:t>
+            </a:r>
+            <a:endParaRPr lang="en-US" b="0" dirty="0" smtClean="0"/>
           </a:p>
           <a:p>
             <a:pPr algn="r">
@@ -35747,26 +36271,7 @@
             </a:pPr>
             <a:r>
               <a:rPr lang="en-US" b="0" dirty="0" smtClean="0"/>
-              <a:t>Get </a:t>
-            </a:r>
-            <a:r>
-              <a:rPr lang="en-US" b="0" dirty="0"/>
-              <a:t>Topic </a:t>
-            </a:r>
-            <a:r>
-              <a:rPr lang="en-US" b="0" dirty="0" smtClean="0"/>
-              <a:t>Info</a:t>
-            </a:r>
-          </a:p>
-          <a:p>
-            <a:pPr algn="r">
-              <a:tabLst>
-                <a:tab pos="228600" algn="l"/>
-              </a:tabLst>
-            </a:pPr>
-            <a:r>
-              <a:rPr lang="en-US" b="0" dirty="0" smtClean="0"/>
-              <a:t>Get Session Info</a:t>
+              <a:t>Get Topics</a:t>
             </a:r>
             <a:endParaRPr lang="en-US" b="0" dirty="0"/>
           </a:p>
@@ -36258,8 +36763,13 @@
             </a:pPr>
             <a:r>
               <a:rPr lang="en-US" b="0" dirty="0"/>
-              <a:t>Open Publication Channel</a:t>
-            </a:r>
+              <a:t>Open Publication </a:t>
+            </a:r>
+            <a:r>
+              <a:rPr lang="en-US" b="0" dirty="0" smtClean="0"/>
+              <a:t>Session</a:t>
+            </a:r>
+            <a:endParaRPr lang="en-US" b="0" dirty="0"/>
           </a:p>
           <a:p>
             <a:pPr>
@@ -36280,8 +36790,13 @@
             </a:pPr>
             <a:r>
               <a:rPr lang="en-US" b="0" dirty="0"/>
-              <a:t>Close Publication Channel</a:t>
-            </a:r>
+              <a:t>Close Publication </a:t>
+            </a:r>
+            <a:r>
+              <a:rPr lang="en-US" b="0" dirty="0" smtClean="0"/>
+              <a:t>Session</a:t>
+            </a:r>
+            <a:endParaRPr lang="en-US" b="0" dirty="0"/>
           </a:p>
         </p:txBody>
       </p:sp>
@@ -36407,8 +36922,8 @@
         </p:nvSpPr>
         <p:spPr bwMode="auto">
           <a:xfrm>
-            <a:off x="4417968" y="4038600"/>
-            <a:ext cx="3583032" cy="1477328"/>
+            <a:off x="5007873" y="4038600"/>
+            <a:ext cx="2993127" cy="1477328"/>
           </a:xfrm>
           <a:prstGeom prst="rect">
             <a:avLst/>
@@ -36433,9 +36948,10 @@
               </a:tabLst>
             </a:pPr>
             <a:r>
-              <a:rPr lang="en-US" b="0" dirty="0"/>
-              <a:t>Subscribe Publication Channel</a:t>
-            </a:r>
+              <a:rPr lang="en-US" b="0" dirty="0" smtClean="0"/>
+              <a:t>Open Subscription Session</a:t>
+            </a:r>
+            <a:endParaRPr lang="en-US" b="0" dirty="0"/>
           </a:p>
           <a:p>
             <a:pPr algn="r">
@@ -36445,8 +36961,13 @@
             </a:pPr>
             <a:r>
               <a:rPr lang="en-US" b="0" dirty="0"/>
-              <a:t>Notify Listener (callback)</a:t>
-            </a:r>
+              <a:t>Notify </a:t>
+            </a:r>
+            <a:r>
+              <a:rPr lang="en-US" b="0" dirty="0" smtClean="0"/>
+              <a:t>Listener</a:t>
+            </a:r>
+            <a:endParaRPr lang="en-US" b="0" dirty="0"/>
           </a:p>
           <a:p>
             <a:pPr algn="r">
@@ -36482,9 +37003,10 @@
               </a:tabLst>
             </a:pPr>
             <a:r>
-              <a:rPr lang="en-US" b="0" dirty="0"/>
-              <a:t>Unsubscribe Publication Channel</a:t>
-            </a:r>
+              <a:rPr lang="en-US" b="0" dirty="0" smtClean="0"/>
+              <a:t>Close Subscription Session</a:t>
+            </a:r>
+            <a:endParaRPr lang="en-US" b="0" dirty="0"/>
           </a:p>
         </p:txBody>
       </p:sp>

</xml_diff>